<commit_message>
added CSP4-rev.pptx, the final presentation slides file
</commit_message>
<xml_diff>
--- a/CSP4.pptx
+++ b/CSP4.pptx
@@ -29,7 +29,7 @@
 </p:presentation>
 </file>
 
-<file path=ppt/charts/chart57.xml><?xml version="1.0" encoding="utf-8"?>
+<file path=ppt/charts/chart60.xml><?xml version="1.0" encoding="utf-8"?>
 <c:chartSpace xmlns:c="http://schemas.openxmlformats.org/drawingml/2006/chart" xmlns:a="http://schemas.openxmlformats.org/drawingml/2006/main" xmlns:r="http://schemas.openxmlformats.org/officeDocument/2006/relationships">
   <c:lang val="en-US"/>
   <c:roundedCorners val="0"/>
@@ -258,11 +258,11 @@
           </c:spPr>
         </c:hiLowLines>
         <c:marker val="0"/>
-        <c:axId val="44932275"/>
-        <c:axId val="59584467"/>
+        <c:axId val="37780351"/>
+        <c:axId val="95560709"/>
       </c:lineChart>
       <c:catAx>
-        <c:axId val="44932275"/>
+        <c:axId val="37780351"/>
         <c:scaling>
           <c:orientation val="minMax"/>
         </c:scaling>
@@ -299,14 +299,14 @@
             </a:pPr>
           </a:p>
         </c:txPr>
-        <c:crossAx val="59584467"/>
+        <c:crossAx val="95560709"/>
         <c:crosses val="autoZero"/>
         <c:auto val="1"/>
         <c:lblAlgn val="ctr"/>
         <c:lblOffset val="100"/>
       </c:catAx>
       <c:valAx>
-        <c:axId val="59584467"/>
+        <c:axId val="95560709"/>
         <c:scaling>
           <c:orientation val="minMax"/>
         </c:scaling>
@@ -340,7 +340,7 @@
             </a:pPr>
           </a:p>
         </c:txPr>
-        <c:crossAx val="44932275"/>
+        <c:crossAx val="37780351"/>
         <c:crosses val="autoZero"/>
         <c:crossBetween val="midCat"/>
       </c:valAx>
@@ -363,7 +363,7 @@
 </c:chartSpace>
 </file>
 
-<file path=ppt/charts/chart58.xml><?xml version="1.0" encoding="utf-8"?>
+<file path=ppt/charts/chart61.xml><?xml version="1.0" encoding="utf-8"?>
 <c:chartSpace xmlns:c="http://schemas.openxmlformats.org/drawingml/2006/chart" xmlns:a="http://schemas.openxmlformats.org/drawingml/2006/main" xmlns:r="http://schemas.openxmlformats.org/officeDocument/2006/relationships">
   <c:lang val="en-US"/>
   <c:roundedCorners val="0"/>
@@ -604,11 +604,11 @@
           </c:spPr>
         </c:hiLowLines>
         <c:marker val="0"/>
-        <c:axId val="3612538"/>
-        <c:axId val="92158446"/>
+        <c:axId val="18295031"/>
+        <c:axId val="54356556"/>
       </c:lineChart>
       <c:catAx>
-        <c:axId val="3612538"/>
+        <c:axId val="18295031"/>
         <c:scaling>
           <c:orientation val="minMax"/>
         </c:scaling>
@@ -645,14 +645,14 @@
             </a:pPr>
           </a:p>
         </c:txPr>
-        <c:crossAx val="92158446"/>
+        <c:crossAx val="54356556"/>
         <c:crosses val="autoZero"/>
         <c:auto val="1"/>
         <c:lblAlgn val="ctr"/>
         <c:lblOffset val="100"/>
       </c:catAx>
       <c:valAx>
-        <c:axId val="92158446"/>
+        <c:axId val="54356556"/>
         <c:scaling>
           <c:orientation val="minMax"/>
         </c:scaling>
@@ -686,7 +686,7 @@
             </a:pPr>
           </a:p>
         </c:txPr>
-        <c:crossAx val="3612538"/>
+        <c:crossAx val="18295031"/>
         <c:crosses val="autoZero"/>
         <c:crossBetween val="midCat"/>
       </c:valAx>
@@ -6718,21 +6718,7 @@
                 </a:uFill>
                 <a:latin typeface="Arial"/>
               </a:rPr>
-              <a:t>Click to edit the outline </a:t>
-            </a:r>
-            <a:r>
-              <a:rPr b="0" lang="en-US" sz="3200" spc="-1" strike="noStrike">
-                <a:solidFill>
-                  <a:srgbClr val="000000"/>
-                </a:solidFill>
-                <a:uFill>
-                  <a:solidFill>
-                    <a:srgbClr val="ffffff"/>
-                  </a:solidFill>
-                </a:uFill>
-                <a:latin typeface="Arial"/>
-              </a:rPr>
-              <a:t>text format</a:t>
+              <a:t>Click to edit the outline text format</a:t>
             </a:r>
             <a:endParaRPr b="0" lang="en-US" sz="3200" spc="-1" strike="noStrike">
               <a:solidFill>
@@ -6942,21 +6928,7 @@
                 </a:uFill>
                 <a:latin typeface="Arial"/>
               </a:rPr>
-              <a:t>Seventh Outline </a:t>
-            </a:r>
-            <a:r>
-              <a:rPr b="0" lang="en-US" sz="2000" spc="-1" strike="noStrike">
-                <a:solidFill>
-                  <a:srgbClr val="000000"/>
-                </a:solidFill>
-                <a:uFill>
-                  <a:solidFill>
-                    <a:srgbClr val="ffffff"/>
-                  </a:solidFill>
-                </a:uFill>
-                <a:latin typeface="Arial"/>
-              </a:rPr>
-              <a:t>Level</a:t>
+              <a:t>Seventh Outline Level</a:t>
             </a:r>
             <a:endParaRPr b="0" lang="en-US" sz="2000" spc="-1" strike="noStrike">
               <a:solidFill>
@@ -7712,7 +7684,21 @@
                 </a:uFill>
                 <a:latin typeface="Arial"/>
               </a:rPr>
-              <a:t>Seventh Outline Level</a:t>
+              <a:t>Seventh Outline </a:t>
+            </a:r>
+            <a:r>
+              <a:rPr b="0" lang="en-US" sz="1800" spc="-1" strike="noStrike">
+                <a:solidFill>
+                  <a:srgbClr val="000000"/>
+                </a:solidFill>
+                <a:uFill>
+                  <a:solidFill>
+                    <a:srgbClr val="ffffff"/>
+                  </a:solidFill>
+                </a:uFill>
+                <a:latin typeface="Arial"/>
+              </a:rPr>
+              <a:t>Level</a:t>
             </a:r>
             <a:endParaRPr b="0" lang="en-US" sz="1800" spc="-1" strike="noStrike">
               <a:solidFill>

</xml_diff>